<commit_message>
style fix style_restau margin in low res
</commit_message>
<xml_diff>
--- a/Présentation Projet 3.pptx
+++ b/Présentation Projet 3.pptx
@@ -4,6 +4,9 @@
   <p:sldMasterIdLst>
     <p:sldMasterId id="2147483732" r:id="rId1"/>
   </p:sldMasterIdLst>
+  <p:notesMasterIdLst>
+    <p:notesMasterId r:id="rId22"/>
+  </p:notesMasterIdLst>
   <p:sldIdLst>
     <p:sldId id="256" r:id="rId2"/>
     <p:sldId id="268" r:id="rId3"/>
@@ -21,9 +24,10 @@
     <p:sldId id="264" r:id="rId15"/>
     <p:sldId id="282" r:id="rId16"/>
     <p:sldId id="283" r:id="rId17"/>
-    <p:sldId id="269" r:id="rId18"/>
-    <p:sldId id="266" r:id="rId19"/>
-    <p:sldId id="267" r:id="rId20"/>
+    <p:sldId id="284" r:id="rId18"/>
+    <p:sldId id="269" r:id="rId19"/>
+    <p:sldId id="266" r:id="rId20"/>
+    <p:sldId id="267" r:id="rId21"/>
   </p:sldIdLst>
   <p:sldSz cx="12192000" cy="6858000"/>
   <p:notesSz cx="6858000" cy="9144000"/>
@@ -130,6 +134,439 @@
 </p:presentation>
 </file>
 
+<file path=ppt/notesMasters/notesMaster1.xml><?xml version="1.0" encoding="utf-8"?>
+<p:notesMaster xmlns:a="http://schemas.openxmlformats.org/drawingml/2006/main" xmlns:r="http://schemas.openxmlformats.org/officeDocument/2006/relationships" xmlns:p="http://schemas.openxmlformats.org/presentationml/2006/main">
+  <p:cSld>
+    <p:bg>
+      <p:bgRef idx="1001">
+        <a:schemeClr val="bg1"/>
+      </p:bgRef>
+    </p:bg>
+    <p:spTree>
+      <p:nvGrpSpPr>
+        <p:cNvPr id="1" name=""/>
+        <p:cNvGrpSpPr/>
+        <p:nvPr/>
+      </p:nvGrpSpPr>
+      <p:grpSpPr>
+        <a:xfrm>
+          <a:off x="0" y="0"/>
+          <a:ext cx="0" cy="0"/>
+          <a:chOff x="0" y="0"/>
+          <a:chExt cx="0" cy="0"/>
+        </a:xfrm>
+      </p:grpSpPr>
+      <p:sp>
+        <p:nvSpPr>
+          <p:cNvPr id="2" name="Espace réservé de l'en-tête 1"/>
+          <p:cNvSpPr>
+            <a:spLocks noGrp="1"/>
+          </p:cNvSpPr>
+          <p:nvPr>
+            <p:ph type="hdr" sz="quarter"/>
+          </p:nvPr>
+        </p:nvSpPr>
+        <p:spPr>
+          <a:xfrm>
+            <a:off x="0" y="0"/>
+            <a:ext cx="2971800" cy="458788"/>
+          </a:xfrm>
+          <a:prstGeom prst="rect">
+            <a:avLst/>
+          </a:prstGeom>
+        </p:spPr>
+        <p:txBody>
+          <a:bodyPr vert="horz" lIns="91440" tIns="45720" rIns="91440" bIns="45720" rtlCol="0"/>
+          <a:lstStyle>
+            <a:lvl1pPr algn="l">
+              <a:defRPr sz="1200"/>
+            </a:lvl1pPr>
+          </a:lstStyle>
+          <a:p>
+            <a:endParaRPr lang="fr-FR"/>
+          </a:p>
+        </p:txBody>
+      </p:sp>
+      <p:sp>
+        <p:nvSpPr>
+          <p:cNvPr id="3" name="Espace réservé de la date 2"/>
+          <p:cNvSpPr>
+            <a:spLocks noGrp="1"/>
+          </p:cNvSpPr>
+          <p:nvPr>
+            <p:ph type="dt" idx="1"/>
+          </p:nvPr>
+        </p:nvSpPr>
+        <p:spPr>
+          <a:xfrm>
+            <a:off x="3884613" y="0"/>
+            <a:ext cx="2971800" cy="458788"/>
+          </a:xfrm>
+          <a:prstGeom prst="rect">
+            <a:avLst/>
+          </a:prstGeom>
+        </p:spPr>
+        <p:txBody>
+          <a:bodyPr vert="horz" lIns="91440" tIns="45720" rIns="91440" bIns="45720" rtlCol="0"/>
+          <a:lstStyle>
+            <a:lvl1pPr algn="r">
+              <a:defRPr sz="1200"/>
+            </a:lvl1pPr>
+          </a:lstStyle>
+          <a:p>
+            <a:fld id="{A2AAADD6-1767-45EB-A3D3-48BFF231D66D}" type="datetimeFigureOut">
+              <a:rPr lang="fr-FR" smtClean="0"/>
+              <a:t>12/11/2023</a:t>
+            </a:fld>
+            <a:endParaRPr lang="fr-FR"/>
+          </a:p>
+        </p:txBody>
+      </p:sp>
+      <p:sp>
+        <p:nvSpPr>
+          <p:cNvPr id="4" name="Espace réservé de l'image des diapositives 3"/>
+          <p:cNvSpPr>
+            <a:spLocks noGrp="1" noRot="1" noChangeAspect="1"/>
+          </p:cNvSpPr>
+          <p:nvPr>
+            <p:ph type="sldImg" idx="2"/>
+          </p:nvPr>
+        </p:nvSpPr>
+        <p:spPr>
+          <a:xfrm>
+            <a:off x="685800" y="1143000"/>
+            <a:ext cx="5486400" cy="3086100"/>
+          </a:xfrm>
+          <a:prstGeom prst="rect">
+            <a:avLst/>
+          </a:prstGeom>
+          <a:noFill/>
+          <a:ln w="12700">
+            <a:solidFill>
+              <a:prstClr val="black"/>
+            </a:solidFill>
+          </a:ln>
+        </p:spPr>
+        <p:txBody>
+          <a:bodyPr vert="horz" lIns="91440" tIns="45720" rIns="91440" bIns="45720" rtlCol="0" anchor="ctr"/>
+          <a:lstStyle/>
+          <a:p>
+            <a:endParaRPr lang="fr-FR"/>
+          </a:p>
+        </p:txBody>
+      </p:sp>
+      <p:sp>
+        <p:nvSpPr>
+          <p:cNvPr id="5" name="Espace réservé des notes 4"/>
+          <p:cNvSpPr>
+            <a:spLocks noGrp="1"/>
+          </p:cNvSpPr>
+          <p:nvPr>
+            <p:ph type="body" sz="quarter" idx="3"/>
+          </p:nvPr>
+        </p:nvSpPr>
+        <p:spPr>
+          <a:xfrm>
+            <a:off x="685800" y="4400550"/>
+            <a:ext cx="5486400" cy="3600450"/>
+          </a:xfrm>
+          <a:prstGeom prst="rect">
+            <a:avLst/>
+          </a:prstGeom>
+        </p:spPr>
+        <p:txBody>
+          <a:bodyPr vert="horz" lIns="91440" tIns="45720" rIns="91440" bIns="45720" rtlCol="0"/>
+          <a:lstStyle/>
+          <a:p>
+            <a:pPr lvl="0"/>
+            <a:r>
+              <a:rPr lang="fr-FR"/>
+              <a:t>Cliquez pour modifier les styles du texte du masque</a:t>
+            </a:r>
+          </a:p>
+          <a:p>
+            <a:pPr lvl="1"/>
+            <a:r>
+              <a:rPr lang="fr-FR"/>
+              <a:t>Deuxième niveau</a:t>
+            </a:r>
+          </a:p>
+          <a:p>
+            <a:pPr lvl="2"/>
+            <a:r>
+              <a:rPr lang="fr-FR"/>
+              <a:t>Troisième niveau</a:t>
+            </a:r>
+          </a:p>
+          <a:p>
+            <a:pPr lvl="3"/>
+            <a:r>
+              <a:rPr lang="fr-FR"/>
+              <a:t>Quatrième niveau</a:t>
+            </a:r>
+          </a:p>
+          <a:p>
+            <a:pPr lvl="4"/>
+            <a:r>
+              <a:rPr lang="fr-FR"/>
+              <a:t>Cinquième niveau</a:t>
+            </a:r>
+          </a:p>
+        </p:txBody>
+      </p:sp>
+      <p:sp>
+        <p:nvSpPr>
+          <p:cNvPr id="6" name="Espace réservé du pied de page 5"/>
+          <p:cNvSpPr>
+            <a:spLocks noGrp="1"/>
+          </p:cNvSpPr>
+          <p:nvPr>
+            <p:ph type="ftr" sz="quarter" idx="4"/>
+          </p:nvPr>
+        </p:nvSpPr>
+        <p:spPr>
+          <a:xfrm>
+            <a:off x="0" y="8685213"/>
+            <a:ext cx="2971800" cy="458787"/>
+          </a:xfrm>
+          <a:prstGeom prst="rect">
+            <a:avLst/>
+          </a:prstGeom>
+        </p:spPr>
+        <p:txBody>
+          <a:bodyPr vert="horz" lIns="91440" tIns="45720" rIns="91440" bIns="45720" rtlCol="0" anchor="b"/>
+          <a:lstStyle>
+            <a:lvl1pPr algn="l">
+              <a:defRPr sz="1200"/>
+            </a:lvl1pPr>
+          </a:lstStyle>
+          <a:p>
+            <a:endParaRPr lang="fr-FR"/>
+          </a:p>
+        </p:txBody>
+      </p:sp>
+      <p:sp>
+        <p:nvSpPr>
+          <p:cNvPr id="7" name="Espace réservé du numéro de diapositive 6"/>
+          <p:cNvSpPr>
+            <a:spLocks noGrp="1"/>
+          </p:cNvSpPr>
+          <p:nvPr>
+            <p:ph type="sldNum" sz="quarter" idx="5"/>
+          </p:nvPr>
+        </p:nvSpPr>
+        <p:spPr>
+          <a:xfrm>
+            <a:off x="3884613" y="8685213"/>
+            <a:ext cx="2971800" cy="458787"/>
+          </a:xfrm>
+          <a:prstGeom prst="rect">
+            <a:avLst/>
+          </a:prstGeom>
+        </p:spPr>
+        <p:txBody>
+          <a:bodyPr vert="horz" lIns="91440" tIns="45720" rIns="91440" bIns="45720" rtlCol="0" anchor="b"/>
+          <a:lstStyle>
+            <a:lvl1pPr algn="r">
+              <a:defRPr sz="1200"/>
+            </a:lvl1pPr>
+          </a:lstStyle>
+          <a:p>
+            <a:fld id="{534EE5E8-2B0E-41E9-9349-CFF0BD0596D0}" type="slidenum">
+              <a:rPr lang="fr-FR" smtClean="0"/>
+              <a:t>‹N°›</a:t>
+            </a:fld>
+            <a:endParaRPr lang="fr-FR"/>
+          </a:p>
+        </p:txBody>
+      </p:sp>
+    </p:spTree>
+    <p:extLst>
+      <p:ext uri="{BB962C8B-B14F-4D97-AF65-F5344CB8AC3E}">
+        <p14:creationId xmlns:p14="http://schemas.microsoft.com/office/powerpoint/2010/main" val="415315116"/>
+      </p:ext>
+    </p:extLst>
+  </p:cSld>
+  <p:clrMap bg1="lt1" tx1="dk1" bg2="lt2" tx2="dk2" accent1="accent1" accent2="accent2" accent3="accent3" accent4="accent4" accent5="accent5" accent6="accent6" hlink="hlink" folHlink="folHlink"/>
+  <p:notesStyle>
+    <a:lvl1pPr marL="0" algn="l" defTabSz="914400" rtl="0" eaLnBrk="1" latinLnBrk="0" hangingPunct="1">
+      <a:defRPr sz="1200" kern="1200">
+        <a:solidFill>
+          <a:schemeClr val="tx1"/>
+        </a:solidFill>
+        <a:latin typeface="+mn-lt"/>
+        <a:ea typeface="+mn-ea"/>
+        <a:cs typeface="+mn-cs"/>
+      </a:defRPr>
+    </a:lvl1pPr>
+    <a:lvl2pPr marL="457200" algn="l" defTabSz="914400" rtl="0" eaLnBrk="1" latinLnBrk="0" hangingPunct="1">
+      <a:defRPr sz="1200" kern="1200">
+        <a:solidFill>
+          <a:schemeClr val="tx1"/>
+        </a:solidFill>
+        <a:latin typeface="+mn-lt"/>
+        <a:ea typeface="+mn-ea"/>
+        <a:cs typeface="+mn-cs"/>
+      </a:defRPr>
+    </a:lvl2pPr>
+    <a:lvl3pPr marL="914400" algn="l" defTabSz="914400" rtl="0" eaLnBrk="1" latinLnBrk="0" hangingPunct="1">
+      <a:defRPr sz="1200" kern="1200">
+        <a:solidFill>
+          <a:schemeClr val="tx1"/>
+        </a:solidFill>
+        <a:latin typeface="+mn-lt"/>
+        <a:ea typeface="+mn-ea"/>
+        <a:cs typeface="+mn-cs"/>
+      </a:defRPr>
+    </a:lvl3pPr>
+    <a:lvl4pPr marL="1371600" algn="l" defTabSz="914400" rtl="0" eaLnBrk="1" latinLnBrk="0" hangingPunct="1">
+      <a:defRPr sz="1200" kern="1200">
+        <a:solidFill>
+          <a:schemeClr val="tx1"/>
+        </a:solidFill>
+        <a:latin typeface="+mn-lt"/>
+        <a:ea typeface="+mn-ea"/>
+        <a:cs typeface="+mn-cs"/>
+      </a:defRPr>
+    </a:lvl4pPr>
+    <a:lvl5pPr marL="1828800" algn="l" defTabSz="914400" rtl="0" eaLnBrk="1" latinLnBrk="0" hangingPunct="1">
+      <a:defRPr sz="1200" kern="1200">
+        <a:solidFill>
+          <a:schemeClr val="tx1"/>
+        </a:solidFill>
+        <a:latin typeface="+mn-lt"/>
+        <a:ea typeface="+mn-ea"/>
+        <a:cs typeface="+mn-cs"/>
+      </a:defRPr>
+    </a:lvl5pPr>
+    <a:lvl6pPr marL="2286000" algn="l" defTabSz="914400" rtl="0" eaLnBrk="1" latinLnBrk="0" hangingPunct="1">
+      <a:defRPr sz="1200" kern="1200">
+        <a:solidFill>
+          <a:schemeClr val="tx1"/>
+        </a:solidFill>
+        <a:latin typeface="+mn-lt"/>
+        <a:ea typeface="+mn-ea"/>
+        <a:cs typeface="+mn-cs"/>
+      </a:defRPr>
+    </a:lvl6pPr>
+    <a:lvl7pPr marL="2743200" algn="l" defTabSz="914400" rtl="0" eaLnBrk="1" latinLnBrk="0" hangingPunct="1">
+      <a:defRPr sz="1200" kern="1200">
+        <a:solidFill>
+          <a:schemeClr val="tx1"/>
+        </a:solidFill>
+        <a:latin typeface="+mn-lt"/>
+        <a:ea typeface="+mn-ea"/>
+        <a:cs typeface="+mn-cs"/>
+      </a:defRPr>
+    </a:lvl7pPr>
+    <a:lvl8pPr marL="3200400" algn="l" defTabSz="914400" rtl="0" eaLnBrk="1" latinLnBrk="0" hangingPunct="1">
+      <a:defRPr sz="1200" kern="1200">
+        <a:solidFill>
+          <a:schemeClr val="tx1"/>
+        </a:solidFill>
+        <a:latin typeface="+mn-lt"/>
+        <a:ea typeface="+mn-ea"/>
+        <a:cs typeface="+mn-cs"/>
+      </a:defRPr>
+    </a:lvl8pPr>
+    <a:lvl9pPr marL="3657600" algn="l" defTabSz="914400" rtl="0" eaLnBrk="1" latinLnBrk="0" hangingPunct="1">
+      <a:defRPr sz="1200" kern="1200">
+        <a:solidFill>
+          <a:schemeClr val="tx1"/>
+        </a:solidFill>
+        <a:latin typeface="+mn-lt"/>
+        <a:ea typeface="+mn-ea"/>
+        <a:cs typeface="+mn-cs"/>
+      </a:defRPr>
+    </a:lvl9pPr>
+  </p:notesStyle>
+</p:notesMaster>
+</file>
+
+<file path=ppt/notesSlides/notesSlide1.xml><?xml version="1.0" encoding="utf-8"?>
+<p:notes xmlns:a="http://schemas.openxmlformats.org/drawingml/2006/main" xmlns:r="http://schemas.openxmlformats.org/officeDocument/2006/relationships" xmlns:p="http://schemas.openxmlformats.org/presentationml/2006/main">
+  <p:cSld>
+    <p:spTree>
+      <p:nvGrpSpPr>
+        <p:cNvPr id="1" name=""/>
+        <p:cNvGrpSpPr/>
+        <p:nvPr/>
+      </p:nvGrpSpPr>
+      <p:grpSpPr>
+        <a:xfrm>
+          <a:off x="0" y="0"/>
+          <a:ext cx="0" cy="0"/>
+          <a:chOff x="0" y="0"/>
+          <a:chExt cx="0" cy="0"/>
+        </a:xfrm>
+      </p:grpSpPr>
+      <p:sp>
+        <p:nvSpPr>
+          <p:cNvPr id="2" name="Espace réservé de l'image des diapositives 1"/>
+          <p:cNvSpPr>
+            <a:spLocks noGrp="1" noRot="1" noChangeAspect="1"/>
+          </p:cNvSpPr>
+          <p:nvPr>
+            <p:ph type="sldImg"/>
+          </p:nvPr>
+        </p:nvSpPr>
+        <p:spPr/>
+      </p:sp>
+      <p:sp>
+        <p:nvSpPr>
+          <p:cNvPr id="3" name="Espace réservé des notes 2"/>
+          <p:cNvSpPr>
+            <a:spLocks noGrp="1"/>
+          </p:cNvSpPr>
+          <p:nvPr>
+            <p:ph type="body" idx="1"/>
+          </p:nvPr>
+        </p:nvSpPr>
+        <p:spPr/>
+        <p:txBody>
+          <a:bodyPr/>
+          <a:lstStyle/>
+          <a:p>
+            <a:endParaRPr lang="fr-FR" dirty="0"/>
+          </a:p>
+        </p:txBody>
+      </p:sp>
+      <p:sp>
+        <p:nvSpPr>
+          <p:cNvPr id="4" name="Espace réservé du numéro de diapositive 3"/>
+          <p:cNvSpPr>
+            <a:spLocks noGrp="1"/>
+          </p:cNvSpPr>
+          <p:nvPr>
+            <p:ph type="sldNum" sz="quarter" idx="5"/>
+          </p:nvPr>
+        </p:nvSpPr>
+        <p:spPr/>
+        <p:txBody>
+          <a:bodyPr/>
+          <a:lstStyle/>
+          <a:p>
+            <a:fld id="{534EE5E8-2B0E-41E9-9349-CFF0BD0596D0}" type="slidenum">
+              <a:rPr lang="fr-FR" smtClean="0"/>
+              <a:t>1</a:t>
+            </a:fld>
+            <a:endParaRPr lang="fr-FR"/>
+          </a:p>
+        </p:txBody>
+      </p:sp>
+    </p:spTree>
+    <p:extLst>
+      <p:ext uri="{BB962C8B-B14F-4D97-AF65-F5344CB8AC3E}">
+        <p14:creationId xmlns:p14="http://schemas.microsoft.com/office/powerpoint/2010/main" val="4049108899"/>
+      </p:ext>
+    </p:extLst>
+  </p:cSld>
+  <p:clrMapOvr>
+    <a:masterClrMapping/>
+  </p:clrMapOvr>
+</p:notes>
+</file>
+
 <file path=ppt/slideLayouts/slideLayout1.xml><?xml version="1.0" encoding="utf-8"?>
 <p:sldLayout xmlns:a="http://schemas.openxmlformats.org/drawingml/2006/main" xmlns:r="http://schemas.openxmlformats.org/officeDocument/2006/relationships" xmlns:p="http://schemas.openxmlformats.org/presentationml/2006/main" type="title" preserve="1">
   <p:cSld name="Diapositive de titre">
@@ -404,7 +841,7 @@
           <a:p>
             <a:fld id="{19369077-25EE-4F7F-B0E4-2B9C8DBDC64D}" type="datetimeFigureOut">
               <a:rPr lang="fr-FR" smtClean="0"/>
-              <a:t>06/11/2023</a:t>
+              <a:t>12/11/2023</a:t>
             </a:fld>
             <a:endParaRPr lang="fr-FR"/>
           </a:p>
@@ -818,7 +1255,7 @@
           <a:p>
             <a:fld id="{19369077-25EE-4F7F-B0E4-2B9C8DBDC64D}" type="datetimeFigureOut">
               <a:rPr lang="fr-FR" smtClean="0"/>
-              <a:t>06/11/2023</a:t>
+              <a:t>12/11/2023</a:t>
             </a:fld>
             <a:endParaRPr lang="fr-FR"/>
           </a:p>
@@ -1154,7 +1591,7 @@
           <a:p>
             <a:fld id="{19369077-25EE-4F7F-B0E4-2B9C8DBDC64D}" type="datetimeFigureOut">
               <a:rPr lang="fr-FR" smtClean="0"/>
-              <a:t>06/11/2023</a:t>
+              <a:t>12/11/2023</a:t>
             </a:fld>
             <a:endParaRPr lang="fr-FR"/>
           </a:p>
@@ -1559,7 +1996,7 @@
           <a:p>
             <a:fld id="{19369077-25EE-4F7F-B0E4-2B9C8DBDC64D}" type="datetimeFigureOut">
               <a:rPr lang="fr-FR" smtClean="0"/>
-              <a:t>06/11/2023</a:t>
+              <a:t>12/11/2023</a:t>
             </a:fld>
             <a:endParaRPr lang="fr-FR"/>
           </a:p>
@@ -2127,7 +2564,7 @@
           <a:p>
             <a:fld id="{19369077-25EE-4F7F-B0E4-2B9C8DBDC64D}" type="datetimeFigureOut">
               <a:rPr lang="fr-FR" smtClean="0"/>
-              <a:t>06/11/2023</a:t>
+              <a:t>12/11/2023</a:t>
             </a:fld>
             <a:endParaRPr lang="fr-FR"/>
           </a:p>
@@ -2808,7 +3245,7 @@
           <a:p>
             <a:fld id="{19369077-25EE-4F7F-B0E4-2B9C8DBDC64D}" type="datetimeFigureOut">
               <a:rPr lang="fr-FR" smtClean="0"/>
-              <a:t>06/11/2023</a:t>
+              <a:t>12/11/2023</a:t>
             </a:fld>
             <a:endParaRPr lang="fr-FR"/>
           </a:p>
@@ -3721,7 +4158,7 @@
           <a:p>
             <a:fld id="{19369077-25EE-4F7F-B0E4-2B9C8DBDC64D}" type="datetimeFigureOut">
               <a:rPr lang="fr-FR" smtClean="0"/>
-              <a:t>06/11/2023</a:t>
+              <a:t>12/11/2023</a:t>
             </a:fld>
             <a:endParaRPr lang="fr-FR"/>
           </a:p>
@@ -4034,7 +4471,7 @@
           <a:p>
             <a:fld id="{19369077-25EE-4F7F-B0E4-2B9C8DBDC64D}" type="datetimeFigureOut">
               <a:rPr lang="fr-FR" smtClean="0"/>
-              <a:t>06/11/2023</a:t>
+              <a:t>12/11/2023</a:t>
             </a:fld>
             <a:endParaRPr lang="fr-FR"/>
           </a:p>
@@ -4298,7 +4735,7 @@
           <a:p>
             <a:fld id="{19369077-25EE-4F7F-B0E4-2B9C8DBDC64D}" type="datetimeFigureOut">
               <a:rPr lang="fr-FR" smtClean="0"/>
-              <a:t>06/11/2023</a:t>
+              <a:t>12/11/2023</a:t>
             </a:fld>
             <a:endParaRPr lang="fr-FR"/>
           </a:p>
@@ -4621,7 +5058,7 @@
           <a:p>
             <a:fld id="{19369077-25EE-4F7F-B0E4-2B9C8DBDC64D}" type="datetimeFigureOut">
               <a:rPr lang="fr-FR" smtClean="0"/>
-              <a:t>06/11/2023</a:t>
+              <a:t>12/11/2023</a:t>
             </a:fld>
             <a:endParaRPr lang="fr-FR"/>
           </a:p>
@@ -5010,7 +5447,7 @@
           <a:p>
             <a:fld id="{19369077-25EE-4F7F-B0E4-2B9C8DBDC64D}" type="datetimeFigureOut">
               <a:rPr lang="fr-FR" smtClean="0"/>
-              <a:t>06/11/2023</a:t>
+              <a:t>12/11/2023</a:t>
             </a:fld>
             <a:endParaRPr lang="fr-FR"/>
           </a:p>
@@ -5386,7 +5823,7 @@
           <a:p>
             <a:fld id="{19369077-25EE-4F7F-B0E4-2B9C8DBDC64D}" type="datetimeFigureOut">
               <a:rPr lang="fr-FR" smtClean="0"/>
-              <a:t>06/11/2023</a:t>
+              <a:t>12/11/2023</a:t>
             </a:fld>
             <a:endParaRPr lang="fr-FR"/>
           </a:p>
@@ -5892,7 +6329,7 @@
           <a:p>
             <a:fld id="{19369077-25EE-4F7F-B0E4-2B9C8DBDC64D}" type="datetimeFigureOut">
               <a:rPr lang="fr-FR" smtClean="0"/>
-              <a:t>06/11/2023</a:t>
+              <a:t>12/11/2023</a:t>
             </a:fld>
             <a:endParaRPr lang="fr-FR"/>
           </a:p>
@@ -6149,7 +6586,7 @@
           <a:p>
             <a:fld id="{19369077-25EE-4F7F-B0E4-2B9C8DBDC64D}" type="datetimeFigureOut">
               <a:rPr lang="fr-FR" smtClean="0"/>
-              <a:t>06/11/2023</a:t>
+              <a:t>12/11/2023</a:t>
             </a:fld>
             <a:endParaRPr lang="fr-FR"/>
           </a:p>
@@ -6312,7 +6749,7 @@
           <a:p>
             <a:fld id="{19369077-25EE-4F7F-B0E4-2B9C8DBDC64D}" type="datetimeFigureOut">
               <a:rPr lang="fr-FR" smtClean="0"/>
-              <a:t>06/11/2023</a:t>
+              <a:t>12/11/2023</a:t>
             </a:fld>
             <a:endParaRPr lang="fr-FR"/>
           </a:p>
@@ -6702,7 +7139,7 @@
           <a:p>
             <a:fld id="{19369077-25EE-4F7F-B0E4-2B9C8DBDC64D}" type="datetimeFigureOut">
               <a:rPr lang="fr-FR" smtClean="0"/>
-              <a:t>06/11/2023</a:t>
+              <a:t>12/11/2023</a:t>
             </a:fld>
             <a:endParaRPr lang="fr-FR"/>
           </a:p>
@@ -7111,7 +7548,7 @@
           <a:p>
             <a:fld id="{19369077-25EE-4F7F-B0E4-2B9C8DBDC64D}" type="datetimeFigureOut">
               <a:rPr lang="fr-FR" smtClean="0"/>
-              <a:t>06/11/2023</a:t>
+              <a:t>12/11/2023</a:t>
             </a:fld>
             <a:endParaRPr lang="fr-FR"/>
           </a:p>
@@ -7355,7 +7792,7 @@
           <a:p>
             <a:fld id="{19369077-25EE-4F7F-B0E4-2B9C8DBDC64D}" type="datetimeFigureOut">
               <a:rPr lang="fr-FR" smtClean="0"/>
-              <a:t>06/11/2023</a:t>
+              <a:t>12/11/2023</a:t>
             </a:fld>
             <a:endParaRPr lang="fr-FR"/>
           </a:p>
@@ -8873,7 +9310,7 @@
           <p:cNvPr id="2" name="Titre 1">
             <a:extLst>
               <a:ext uri="{FF2B5EF4-FFF2-40B4-BE49-F238E27FC236}">
-                <a16:creationId xmlns:a16="http://schemas.microsoft.com/office/drawing/2014/main" id="{7B128D62-9D53-A6F9-475B-50B316CF94CF}"/>
+                <a16:creationId xmlns:a16="http://schemas.microsoft.com/office/drawing/2014/main" id="{24381CC9-B45B-3626-426C-42192CDFAE71}"/>
               </a:ext>
             </a:extLst>
           </p:cNvPr>
@@ -8884,116 +9321,27 @@
             <p:ph type="title"/>
           </p:nvPr>
         </p:nvSpPr>
-        <p:spPr/>
+        <p:spPr>
+          <a:xfrm>
+            <a:off x="3391771" y="3267828"/>
+            <a:ext cx="5187079" cy="1080938"/>
+          </a:xfrm>
+        </p:spPr>
         <p:txBody>
           <a:bodyPr/>
           <a:lstStyle/>
           <a:p>
-            <a:pPr algn="ctr"/>
             <a:r>
               <a:rPr lang="fr-FR" dirty="0"/>
-              <a:t>Validation W3C</a:t>
-            </a:r>
-          </a:p>
-        </p:txBody>
-      </p:sp>
-      <p:sp>
-        <p:nvSpPr>
-          <p:cNvPr id="10" name="ZoneTexte 9">
-            <a:extLst>
-              <a:ext uri="{FF2B5EF4-FFF2-40B4-BE49-F238E27FC236}">
-                <a16:creationId xmlns:a16="http://schemas.microsoft.com/office/drawing/2014/main" id="{04E96FC7-873F-8ADE-4F93-EFCBA515F7B8}"/>
-              </a:ext>
-            </a:extLst>
-          </p:cNvPr>
-          <p:cNvSpPr txBox="1"/>
-          <p:nvPr/>
-        </p:nvSpPr>
-        <p:spPr>
-          <a:xfrm>
-            <a:off x="2769061" y="6068965"/>
-            <a:ext cx="6022803" cy="369332"/>
-          </a:xfrm>
-          <a:prstGeom prst="rect">
-            <a:avLst/>
-          </a:prstGeom>
-          <a:noFill/>
-        </p:spPr>
-        <p:txBody>
-          <a:bodyPr wrap="none" rtlCol="0">
-            <a:spAutoFit/>
-          </a:bodyPr>
-          <a:lstStyle/>
-          <a:p>
-            <a:r>
-              <a:rPr lang="fr-FR" dirty="0"/>
-              <a:t>Le site est affiché correctement avec Chrome et Firefox</a:t>
-            </a:r>
-          </a:p>
-        </p:txBody>
-      </p:sp>
-      <p:pic>
-        <p:nvPicPr>
-          <p:cNvPr id="11" name="Espace réservé du contenu 10">
-            <a:extLst>
-              <a:ext uri="{FF2B5EF4-FFF2-40B4-BE49-F238E27FC236}">
-                <a16:creationId xmlns:a16="http://schemas.microsoft.com/office/drawing/2014/main" id="{3F4DE7A1-F1CF-B31D-E183-279AD05FDBA2}"/>
-              </a:ext>
-            </a:extLst>
-          </p:cNvPr>
-          <p:cNvPicPr>
-            <a:picLocks noGrp="1" noChangeAspect="1"/>
-          </p:cNvPicPr>
-          <p:nvPr>
-            <p:ph sz="half" idx="1"/>
-          </p:nvPr>
-        </p:nvPicPr>
-        <p:blipFill>
-          <a:blip r:embed="rId2"/>
-          <a:stretch>
-            <a:fillRect/>
-          </a:stretch>
-        </p:blipFill>
-        <p:spPr>
-          <a:xfrm>
-            <a:off x="1326896" y="2336800"/>
-            <a:ext cx="3405695" cy="3598863"/>
-          </a:xfrm>
-        </p:spPr>
-      </p:pic>
-      <p:pic>
-        <p:nvPicPr>
-          <p:cNvPr id="13" name="Espace réservé du contenu 12">
-            <a:extLst>
-              <a:ext uri="{FF2B5EF4-FFF2-40B4-BE49-F238E27FC236}">
-                <a16:creationId xmlns:a16="http://schemas.microsoft.com/office/drawing/2014/main" id="{40AB50A4-8312-8BE6-C83F-6D9CEA15508A}"/>
-              </a:ext>
-            </a:extLst>
-          </p:cNvPr>
-          <p:cNvPicPr>
-            <a:picLocks noGrp="1" noChangeAspect="1"/>
-          </p:cNvPicPr>
-          <p:nvPr>
-            <p:ph sz="half" idx="2"/>
-          </p:nvPr>
-        </p:nvPicPr>
-        <p:blipFill>
-          <a:blip r:embed="rId3"/>
-          <a:stretch>
-            <a:fillRect/>
-          </a:stretch>
-        </p:blipFill>
-        <p:spPr>
-          <a:xfrm>
-            <a:off x="5971487" y="2336800"/>
-            <a:ext cx="3946314" cy="3598863"/>
-          </a:xfrm>
-        </p:spPr>
-      </p:pic>
+              <a:t>Présentation du site</a:t>
+            </a:r>
+          </a:p>
+        </p:txBody>
+      </p:sp>
     </p:spTree>
     <p:extLst>
       <p:ext uri="{BB962C8B-B14F-4D97-AF65-F5344CB8AC3E}">
-        <p14:creationId xmlns:p14="http://schemas.microsoft.com/office/powerpoint/2010/main" val="2873988255"/>
+        <p14:creationId xmlns:p14="http://schemas.microsoft.com/office/powerpoint/2010/main" val="2489298391"/>
       </p:ext>
     </p:extLst>
   </p:cSld>
@@ -9025,7 +9373,7 @@
           <p:cNvPr id="2" name="Titre 1">
             <a:extLst>
               <a:ext uri="{FF2B5EF4-FFF2-40B4-BE49-F238E27FC236}">
-                <a16:creationId xmlns:a16="http://schemas.microsoft.com/office/drawing/2014/main" id="{7D6AE7B7-BC19-C25C-61E1-27D872D78715}"/>
+                <a16:creationId xmlns:a16="http://schemas.microsoft.com/office/drawing/2014/main" id="{7B128D62-9D53-A6F9-475B-50B316CF94CF}"/>
               </a:ext>
             </a:extLst>
           </p:cNvPr>
@@ -9044,82 +9392,108 @@
             <a:pPr algn="ctr"/>
             <a:r>
               <a:rPr lang="fr-FR" dirty="0"/>
-              <a:t>Difficultés rencontrées</a:t>
-            </a:r>
-          </a:p>
-        </p:txBody>
-      </p:sp>
-      <p:sp>
-        <p:nvSpPr>
-          <p:cNvPr id="3" name="Espace réservé du contenu 2">
+              <a:t>Validation W3C</a:t>
+            </a:r>
+          </a:p>
+        </p:txBody>
+      </p:sp>
+      <p:sp>
+        <p:nvSpPr>
+          <p:cNvPr id="10" name="ZoneTexte 9">
             <a:extLst>
               <a:ext uri="{FF2B5EF4-FFF2-40B4-BE49-F238E27FC236}">
-                <a16:creationId xmlns:a16="http://schemas.microsoft.com/office/drawing/2014/main" id="{D04D9781-5395-8916-1F72-15AE379A991E}"/>
+                <a16:creationId xmlns:a16="http://schemas.microsoft.com/office/drawing/2014/main" id="{04E96FC7-873F-8ADE-4F93-EFCBA515F7B8}"/>
               </a:ext>
             </a:extLst>
           </p:cNvPr>
-          <p:cNvSpPr>
-            <a:spLocks noGrp="1"/>
-          </p:cNvSpPr>
-          <p:nvPr>
-            <p:ph idx="1"/>
-          </p:nvPr>
-        </p:nvSpPr>
-        <p:spPr>
-          <a:xfrm>
-            <a:off x="680321" y="2978149"/>
-            <a:ext cx="9613861" cy="2958039"/>
-          </a:xfrm>
-        </p:spPr>
-        <p:txBody>
-          <a:bodyPr/>
+          <p:cNvSpPr txBox="1"/>
+          <p:nvPr/>
+        </p:nvSpPr>
+        <p:spPr>
+          <a:xfrm>
+            <a:off x="2769061" y="6068965"/>
+            <a:ext cx="6022803" cy="369332"/>
+          </a:xfrm>
+          <a:prstGeom prst="rect">
+            <a:avLst/>
+          </a:prstGeom>
+          <a:noFill/>
+        </p:spPr>
+        <p:txBody>
+          <a:bodyPr wrap="none" rtlCol="0">
+            <a:spAutoFit/>
+          </a:bodyPr>
           <a:lstStyle/>
           <a:p>
             <a:r>
               <a:rPr lang="fr-FR" dirty="0"/>
-              <a:t>Problème de </a:t>
-            </a:r>
-            <a:r>
-              <a:rPr lang="fr-FR" dirty="0" err="1"/>
-              <a:t>padding</a:t>
-            </a:r>
-            <a:r>
-              <a:rPr lang="fr-FR" dirty="0"/>
-              <a:t> et de </a:t>
-            </a:r>
-            <a:r>
-              <a:rPr lang="fr-FR" dirty="0" err="1"/>
-              <a:t>box-sizing:border-box</a:t>
-            </a:r>
-            <a:r>
-              <a:rPr lang="fr-FR" dirty="0"/>
-              <a:t>.</a:t>
-            </a:r>
-          </a:p>
-          <a:p>
-            <a:r>
-              <a:rPr lang="fr-FR" dirty="0"/>
-              <a:t>Mise en forme des coches vertes.</a:t>
-            </a:r>
-          </a:p>
-          <a:p>
-            <a:r>
-              <a:rPr lang="fr-FR" dirty="0"/>
-              <a:t>Création du dégradé avec le bouton Like.</a:t>
-            </a:r>
-          </a:p>
-          <a:p>
-            <a:r>
-              <a:rPr lang="fr-FR" dirty="0"/>
-              <a:t>Problèmes de push avec Git.</a:t>
-            </a:r>
-          </a:p>
-        </p:txBody>
-      </p:sp>
+              <a:t>Le site est affiché correctement avec Chrome et Firefox</a:t>
+            </a:r>
+          </a:p>
+        </p:txBody>
+      </p:sp>
+      <p:pic>
+        <p:nvPicPr>
+          <p:cNvPr id="11" name="Espace réservé du contenu 10">
+            <a:extLst>
+              <a:ext uri="{FF2B5EF4-FFF2-40B4-BE49-F238E27FC236}">
+                <a16:creationId xmlns:a16="http://schemas.microsoft.com/office/drawing/2014/main" id="{3F4DE7A1-F1CF-B31D-E183-279AD05FDBA2}"/>
+              </a:ext>
+            </a:extLst>
+          </p:cNvPr>
+          <p:cNvPicPr>
+            <a:picLocks noGrp="1" noChangeAspect="1"/>
+          </p:cNvPicPr>
+          <p:nvPr>
+            <p:ph sz="half" idx="1"/>
+          </p:nvPr>
+        </p:nvPicPr>
+        <p:blipFill>
+          <a:blip r:embed="rId2"/>
+          <a:stretch>
+            <a:fillRect/>
+          </a:stretch>
+        </p:blipFill>
+        <p:spPr>
+          <a:xfrm>
+            <a:off x="1326896" y="2336800"/>
+            <a:ext cx="3405695" cy="3598863"/>
+          </a:xfrm>
+        </p:spPr>
+      </p:pic>
+      <p:pic>
+        <p:nvPicPr>
+          <p:cNvPr id="13" name="Espace réservé du contenu 12">
+            <a:extLst>
+              <a:ext uri="{FF2B5EF4-FFF2-40B4-BE49-F238E27FC236}">
+                <a16:creationId xmlns:a16="http://schemas.microsoft.com/office/drawing/2014/main" id="{40AB50A4-8312-8BE6-C83F-6D9CEA15508A}"/>
+              </a:ext>
+            </a:extLst>
+          </p:cNvPr>
+          <p:cNvPicPr>
+            <a:picLocks noGrp="1" noChangeAspect="1"/>
+          </p:cNvPicPr>
+          <p:nvPr>
+            <p:ph sz="half" idx="2"/>
+          </p:nvPr>
+        </p:nvPicPr>
+        <p:blipFill>
+          <a:blip r:embed="rId3"/>
+          <a:stretch>
+            <a:fillRect/>
+          </a:stretch>
+        </p:blipFill>
+        <p:spPr>
+          <a:xfrm>
+            <a:off x="5971487" y="2336800"/>
+            <a:ext cx="3946314" cy="3598863"/>
+          </a:xfrm>
+        </p:spPr>
+      </p:pic>
     </p:spTree>
     <p:extLst>
       <p:ext uri="{BB962C8B-B14F-4D97-AF65-F5344CB8AC3E}">
-        <p14:creationId xmlns:p14="http://schemas.microsoft.com/office/powerpoint/2010/main" val="1289766318"/>
+        <p14:creationId xmlns:p14="http://schemas.microsoft.com/office/powerpoint/2010/main" val="2873988255"/>
       </p:ext>
     </p:extLst>
   </p:cSld>
@@ -9151,7 +9525,7 @@
           <p:cNvPr id="2" name="Titre 1">
             <a:extLst>
               <a:ext uri="{FF2B5EF4-FFF2-40B4-BE49-F238E27FC236}">
-                <a16:creationId xmlns:a16="http://schemas.microsoft.com/office/drawing/2014/main" id="{A2E6D528-F770-6A86-4323-6EEFAE428E24}"/>
+                <a16:creationId xmlns:a16="http://schemas.microsoft.com/office/drawing/2014/main" id="{7D6AE7B7-BC19-C25C-61E1-27D872D78715}"/>
               </a:ext>
             </a:extLst>
           </p:cNvPr>
@@ -9170,7 +9544,7 @@
             <a:pPr algn="ctr"/>
             <a:r>
               <a:rPr lang="fr-FR" dirty="0"/>
-              <a:t>Points d’amélioration</a:t>
+              <a:t>Difficultés rencontrées</a:t>
             </a:r>
           </a:p>
         </p:txBody>
@@ -9180,7 +9554,7 @@
           <p:cNvPr id="3" name="Espace réservé du contenu 2">
             <a:extLst>
               <a:ext uri="{FF2B5EF4-FFF2-40B4-BE49-F238E27FC236}">
-                <a16:creationId xmlns:a16="http://schemas.microsoft.com/office/drawing/2014/main" id="{13B950E0-F427-F7F7-3DAD-1ADB81CE1C49}"/>
+                <a16:creationId xmlns:a16="http://schemas.microsoft.com/office/drawing/2014/main" id="{D04D9781-5395-8916-1F72-15AE379A991E}"/>
               </a:ext>
             </a:extLst>
           </p:cNvPr>
@@ -9191,72 +9565,59 @@
             <p:ph idx="1"/>
           </p:nvPr>
         </p:nvSpPr>
-        <p:spPr/>
-        <p:txBody>
-          <a:bodyPr>
-            <a:normAutofit fontScale="92500" lnSpcReduction="10000"/>
-          </a:bodyPr>
+        <p:spPr>
+          <a:xfrm>
+            <a:off x="680321" y="2978149"/>
+            <a:ext cx="9613861" cy="2958039"/>
+          </a:xfrm>
+        </p:spPr>
+        <p:txBody>
+          <a:bodyPr/>
           <a:lstStyle/>
           <a:p>
             <a:r>
               <a:rPr lang="fr-FR" dirty="0"/>
-              <a:t>Certaines valeurs de </a:t>
+              <a:t>Problème de </a:t>
             </a:r>
             <a:r>
               <a:rPr lang="fr-FR" dirty="0" err="1"/>
-              <a:t>Margin</a:t>
+              <a:t>padding</a:t>
             </a:r>
             <a:r>
               <a:rPr lang="fr-FR" dirty="0"/>
-              <a:t> et </a:t>
+              <a:t> et de </a:t>
             </a:r>
             <a:r>
               <a:rPr lang="fr-FR" dirty="0" err="1"/>
-              <a:t>Padding</a:t>
+              <a:t>box-sizing:border-box</a:t>
             </a:r>
             <a:r>
               <a:rPr lang="fr-FR" dirty="0"/>
-              <a:t> pourraient être retravaillées pour être plus cohérentes.</a:t>
+              <a:t>.</a:t>
             </a:r>
           </a:p>
           <a:p>
             <a:r>
               <a:rPr lang="fr-FR" dirty="0"/>
-              <a:t>Problème de priorisation. Un attribut a été forcé avec la valeur !Important.</a:t>
+              <a:t>Mise en forme des coches vertes.</a:t>
             </a:r>
           </a:p>
           <a:p>
             <a:r>
               <a:rPr lang="fr-FR" dirty="0"/>
-              <a:t>Le code CSS </a:t>
-            </a:r>
-            <a:r>
-              <a:rPr lang="fr-FR" dirty="0" err="1"/>
-              <a:t>pouraît</a:t>
-            </a:r>
+              <a:t>Création du dégradé avec le bouton Like.</a:t>
+            </a:r>
+          </a:p>
+          <a:p>
             <a:r>
               <a:rPr lang="fr-FR" dirty="0"/>
-              <a:t> être davantage optimisé. Certaines lignes de code sont redondantes.</a:t>
+              <a:t>Problèmes de push avec Git.</a:t>
             </a:r>
           </a:p>
           <a:p>
             <a:r>
               <a:rPr lang="fr-FR" dirty="0"/>
-              <a:t>L’animation de page d’accueil est trop simple.</a:t>
-            </a:r>
-          </a:p>
-          <a:p>
-            <a:r>
-              <a:rPr lang="fr-FR" dirty="0"/>
-              <a:t>L’image de fond pour les </a:t>
-            </a:r>
-            <a:r>
-              <a:rPr lang="fr-FR"/>
-              <a:t>pages restaurant </a:t>
-            </a:r>
-            <a:r>
-              <a:rPr lang="fr-FR" dirty="0"/>
-              <a:t>a été implémentée en utilisant background-image dans le CSS. Il aurait mieux valu en faire un élément du code HTML pour simplifier l’ajout de futures pages.</a:t>
+              <a:t>Problème d’alignement du logo dans le header avec la flèche de retour.</a:t>
             </a:r>
           </a:p>
         </p:txBody>
@@ -9264,7 +9625,7 @@
     </p:spTree>
     <p:extLst>
       <p:ext uri="{BB962C8B-B14F-4D97-AF65-F5344CB8AC3E}">
-        <p14:creationId xmlns:p14="http://schemas.microsoft.com/office/powerpoint/2010/main" val="2042786511"/>
+        <p14:creationId xmlns:p14="http://schemas.microsoft.com/office/powerpoint/2010/main" val="1289766318"/>
       </p:ext>
     </p:extLst>
   </p:cSld>
@@ -9366,6 +9727,143 @@
     <p:extLst>
       <p:ext uri="{BB962C8B-B14F-4D97-AF65-F5344CB8AC3E}">
         <p14:creationId xmlns:p14="http://schemas.microsoft.com/office/powerpoint/2010/main" val="4196261142"/>
+      </p:ext>
+    </p:extLst>
+  </p:cSld>
+  <p:clrMapOvr>
+    <a:masterClrMapping/>
+  </p:clrMapOvr>
+</p:sld>
+</file>
+
+<file path=ppt/slides/slide20.xml><?xml version="1.0" encoding="utf-8"?>
+<p:sld xmlns:a="http://schemas.openxmlformats.org/drawingml/2006/main" xmlns:r="http://schemas.openxmlformats.org/officeDocument/2006/relationships" xmlns:p="http://schemas.openxmlformats.org/presentationml/2006/main">
+  <p:cSld>
+    <p:spTree>
+      <p:nvGrpSpPr>
+        <p:cNvPr id="1" name=""/>
+        <p:cNvGrpSpPr/>
+        <p:nvPr/>
+      </p:nvGrpSpPr>
+      <p:grpSpPr>
+        <a:xfrm>
+          <a:off x="0" y="0"/>
+          <a:ext cx="0" cy="0"/>
+          <a:chOff x="0" y="0"/>
+          <a:chExt cx="0" cy="0"/>
+        </a:xfrm>
+      </p:grpSpPr>
+      <p:sp>
+        <p:nvSpPr>
+          <p:cNvPr id="2" name="Titre 1">
+            <a:extLst>
+              <a:ext uri="{FF2B5EF4-FFF2-40B4-BE49-F238E27FC236}">
+                <a16:creationId xmlns:a16="http://schemas.microsoft.com/office/drawing/2014/main" id="{A2E6D528-F770-6A86-4323-6EEFAE428E24}"/>
+              </a:ext>
+            </a:extLst>
+          </p:cNvPr>
+          <p:cNvSpPr>
+            <a:spLocks noGrp="1"/>
+          </p:cNvSpPr>
+          <p:nvPr>
+            <p:ph type="title"/>
+          </p:nvPr>
+        </p:nvSpPr>
+        <p:spPr/>
+        <p:txBody>
+          <a:bodyPr/>
+          <a:lstStyle/>
+          <a:p>
+            <a:pPr algn="ctr"/>
+            <a:r>
+              <a:rPr lang="fr-FR" dirty="0"/>
+              <a:t>Points d’amélioration</a:t>
+            </a:r>
+          </a:p>
+        </p:txBody>
+      </p:sp>
+      <p:sp>
+        <p:nvSpPr>
+          <p:cNvPr id="3" name="Espace réservé du contenu 2">
+            <a:extLst>
+              <a:ext uri="{FF2B5EF4-FFF2-40B4-BE49-F238E27FC236}">
+                <a16:creationId xmlns:a16="http://schemas.microsoft.com/office/drawing/2014/main" id="{13B950E0-F427-F7F7-3DAD-1ADB81CE1C49}"/>
+              </a:ext>
+            </a:extLst>
+          </p:cNvPr>
+          <p:cNvSpPr>
+            <a:spLocks noGrp="1"/>
+          </p:cNvSpPr>
+          <p:nvPr>
+            <p:ph idx="1"/>
+          </p:nvPr>
+        </p:nvSpPr>
+        <p:spPr/>
+        <p:txBody>
+          <a:bodyPr>
+            <a:normAutofit fontScale="92500" lnSpcReduction="10000"/>
+          </a:bodyPr>
+          <a:lstStyle/>
+          <a:p>
+            <a:r>
+              <a:rPr lang="fr-FR" dirty="0"/>
+              <a:t>Certaines valeurs de </a:t>
+            </a:r>
+            <a:r>
+              <a:rPr lang="fr-FR" dirty="0" err="1"/>
+              <a:t>Margin</a:t>
+            </a:r>
+            <a:r>
+              <a:rPr lang="fr-FR" dirty="0"/>
+              <a:t> et </a:t>
+            </a:r>
+            <a:r>
+              <a:rPr lang="fr-FR" dirty="0" err="1"/>
+              <a:t>Padding</a:t>
+            </a:r>
+            <a:r>
+              <a:rPr lang="fr-FR" dirty="0"/>
+              <a:t> pourraient être retravaillées pour être plus cohérentes.</a:t>
+            </a:r>
+          </a:p>
+          <a:p>
+            <a:r>
+              <a:rPr lang="fr-FR" dirty="0"/>
+              <a:t>Problème de priorisation. Un attribut a été forcé avec la valeur !Important.</a:t>
+            </a:r>
+          </a:p>
+          <a:p>
+            <a:r>
+              <a:rPr lang="fr-FR" dirty="0"/>
+              <a:t>Le code CSS </a:t>
+            </a:r>
+            <a:r>
+              <a:rPr lang="fr-FR" dirty="0" err="1"/>
+              <a:t>pouraît</a:t>
+            </a:r>
+            <a:r>
+              <a:rPr lang="fr-FR" dirty="0"/>
+              <a:t> être davantage optimisé. Certaines lignes de code sont redondantes.</a:t>
+            </a:r>
+          </a:p>
+          <a:p>
+            <a:r>
+              <a:rPr lang="fr-FR" dirty="0"/>
+              <a:t>L’animation de page d’accueil est trop simple.</a:t>
+            </a:r>
+          </a:p>
+          <a:p>
+            <a:r>
+              <a:rPr lang="fr-FR" dirty="0"/>
+              <a:t>L’image de fond pour les pages restaurant a été implémentée en utilisant background-image dans le CSS. Il aurait mieux valu en faire un élément du code HTML pour simplifier l’ajout de futures pages.</a:t>
+            </a:r>
+          </a:p>
+        </p:txBody>
+      </p:sp>
+    </p:spTree>
+    <p:extLst>
+      <p:ext uri="{BB962C8B-B14F-4D97-AF65-F5344CB8AC3E}">
+        <p14:creationId xmlns:p14="http://schemas.microsoft.com/office/powerpoint/2010/main" val="2042786511"/>
       </p:ext>
     </p:extLst>
   </p:cSld>
@@ -10526,4 +11024,299 @@
     </a:ext>
   </a:extLst>
 </a:theme>
+</file>
+
+<file path=ppt/theme/theme2.xml><?xml version="1.0" encoding="utf-8"?>
+<a:theme xmlns:a="http://schemas.openxmlformats.org/drawingml/2006/main" name="Thème Office">
+  <a:themeElements>
+    <a:clrScheme name="Office">
+      <a:dk1>
+        <a:sysClr val="windowText" lastClr="000000"/>
+      </a:dk1>
+      <a:lt1>
+        <a:sysClr val="window" lastClr="FFFFFF"/>
+      </a:lt1>
+      <a:dk2>
+        <a:srgbClr val="44546A"/>
+      </a:dk2>
+      <a:lt2>
+        <a:srgbClr val="E7E6E6"/>
+      </a:lt2>
+      <a:accent1>
+        <a:srgbClr val="4472C4"/>
+      </a:accent1>
+      <a:accent2>
+        <a:srgbClr val="ED7D31"/>
+      </a:accent2>
+      <a:accent3>
+        <a:srgbClr val="A5A5A5"/>
+      </a:accent3>
+      <a:accent4>
+        <a:srgbClr val="FFC000"/>
+      </a:accent4>
+      <a:accent5>
+        <a:srgbClr val="5B9BD5"/>
+      </a:accent5>
+      <a:accent6>
+        <a:srgbClr val="70AD47"/>
+      </a:accent6>
+      <a:hlink>
+        <a:srgbClr val="0563C1"/>
+      </a:hlink>
+      <a:folHlink>
+        <a:srgbClr val="954F72"/>
+      </a:folHlink>
+    </a:clrScheme>
+    <a:fontScheme name="Office">
+      <a:majorFont>
+        <a:latin typeface="Calibri Light" panose="020F0302020204030204"/>
+        <a:ea typeface=""/>
+        <a:cs typeface=""/>
+        <a:font script="Jpan" typeface="游ゴシック Light"/>
+        <a:font script="Hang" typeface="맑은 고딕"/>
+        <a:font script="Hans" typeface="等线 Light"/>
+        <a:font script="Hant" typeface="新細明體"/>
+        <a:font script="Arab" typeface="Times New Roman"/>
+        <a:font script="Hebr" typeface="Times New Roman"/>
+        <a:font script="Thai" typeface="Angsana New"/>
+        <a:font script="Ethi" typeface="Nyala"/>
+        <a:font script="Beng" typeface="Vrinda"/>
+        <a:font script="Gujr" typeface="Shruti"/>
+        <a:font script="Khmr" typeface="MoolBoran"/>
+        <a:font script="Knda" typeface="Tunga"/>
+        <a:font script="Guru" typeface="Raavi"/>
+        <a:font script="Cans" typeface="Euphemia"/>
+        <a:font script="Cher" typeface="Plantagenet Cherokee"/>
+        <a:font script="Yiii" typeface="Microsoft Yi Baiti"/>
+        <a:font script="Tibt" typeface="Microsoft Himalaya"/>
+        <a:font script="Thaa" typeface="MV Boli"/>
+        <a:font script="Deva" typeface="Mangal"/>
+        <a:font script="Telu" typeface="Gautami"/>
+        <a:font script="Taml" typeface="Latha"/>
+        <a:font script="Syrc" typeface="Estrangelo Edessa"/>
+        <a:font script="Orya" typeface="Kalinga"/>
+        <a:font script="Mlym" typeface="Kartika"/>
+        <a:font script="Laoo" typeface="DokChampa"/>
+        <a:font script="Sinh" typeface="Iskoola Pota"/>
+        <a:font script="Mong" typeface="Mongolian Baiti"/>
+        <a:font script="Viet" typeface="Times New Roman"/>
+        <a:font script="Uigh" typeface="Microsoft Uighur"/>
+        <a:font script="Geor" typeface="Sylfaen"/>
+        <a:font script="Armn" typeface="Arial"/>
+        <a:font script="Bugi" typeface="Leelawadee UI"/>
+        <a:font script="Bopo" typeface="Microsoft JhengHei"/>
+        <a:font script="Java" typeface="Javanese Text"/>
+        <a:font script="Lisu" typeface="Segoe UI"/>
+        <a:font script="Mymr" typeface="Myanmar Text"/>
+        <a:font script="Nkoo" typeface="Ebrima"/>
+        <a:font script="Olck" typeface="Nirmala UI"/>
+        <a:font script="Osma" typeface="Ebrima"/>
+        <a:font script="Phag" typeface="Phagspa"/>
+        <a:font script="Syrn" typeface="Estrangelo Edessa"/>
+        <a:font script="Syrj" typeface="Estrangelo Edessa"/>
+        <a:font script="Syre" typeface="Estrangelo Edessa"/>
+        <a:font script="Sora" typeface="Nirmala UI"/>
+        <a:font script="Tale" typeface="Microsoft Tai Le"/>
+        <a:font script="Talu" typeface="Microsoft New Tai Lue"/>
+        <a:font script="Tfng" typeface="Ebrima"/>
+      </a:majorFont>
+      <a:minorFont>
+        <a:latin typeface="Calibri" panose="020F0502020204030204"/>
+        <a:ea typeface=""/>
+        <a:cs typeface=""/>
+        <a:font script="Jpan" typeface="游ゴシック"/>
+        <a:font script="Hang" typeface="맑은 고딕"/>
+        <a:font script="Hans" typeface="等线"/>
+        <a:font script="Hant" typeface="新細明體"/>
+        <a:font script="Arab" typeface="Arial"/>
+        <a:font script="Hebr" typeface="Arial"/>
+        <a:font script="Thai" typeface="Cordia New"/>
+        <a:font script="Ethi" typeface="Nyala"/>
+        <a:font script="Beng" typeface="Vrinda"/>
+        <a:font script="Gujr" typeface="Shruti"/>
+        <a:font script="Khmr" typeface="DaunPenh"/>
+        <a:font script="Knda" typeface="Tunga"/>
+        <a:font script="Guru" typeface="Raavi"/>
+        <a:font script="Cans" typeface="Euphemia"/>
+        <a:font script="Cher" typeface="Plantagenet Cherokee"/>
+        <a:font script="Yiii" typeface="Microsoft Yi Baiti"/>
+        <a:font script="Tibt" typeface="Microsoft Himalaya"/>
+        <a:font script="Thaa" typeface="MV Boli"/>
+        <a:font script="Deva" typeface="Mangal"/>
+        <a:font script="Telu" typeface="Gautami"/>
+        <a:font script="Taml" typeface="Latha"/>
+        <a:font script="Syrc" typeface="Estrangelo Edessa"/>
+        <a:font script="Orya" typeface="Kalinga"/>
+        <a:font script="Mlym" typeface="Kartika"/>
+        <a:font script="Laoo" typeface="DokChampa"/>
+        <a:font script="Sinh" typeface="Iskoola Pota"/>
+        <a:font script="Mong" typeface="Mongolian Baiti"/>
+        <a:font script="Viet" typeface="Arial"/>
+        <a:font script="Uigh" typeface="Microsoft Uighur"/>
+        <a:font script="Geor" typeface="Sylfaen"/>
+        <a:font script="Armn" typeface="Arial"/>
+        <a:font script="Bugi" typeface="Leelawadee UI"/>
+        <a:font script="Bopo" typeface="Microsoft JhengHei"/>
+        <a:font script="Java" typeface="Javanese Text"/>
+        <a:font script="Lisu" typeface="Segoe UI"/>
+        <a:font script="Mymr" typeface="Myanmar Text"/>
+        <a:font script="Nkoo" typeface="Ebrima"/>
+        <a:font script="Olck" typeface="Nirmala UI"/>
+        <a:font script="Osma" typeface="Ebrima"/>
+        <a:font script="Phag" typeface="Phagspa"/>
+        <a:font script="Syrn" typeface="Estrangelo Edessa"/>
+        <a:font script="Syrj" typeface="Estrangelo Edessa"/>
+        <a:font script="Syre" typeface="Estrangelo Edessa"/>
+        <a:font script="Sora" typeface="Nirmala UI"/>
+        <a:font script="Tale" typeface="Microsoft Tai Le"/>
+        <a:font script="Talu" typeface="Microsoft New Tai Lue"/>
+        <a:font script="Tfng" typeface="Ebrima"/>
+      </a:minorFont>
+    </a:fontScheme>
+    <a:fmtScheme name="Office">
+      <a:fillStyleLst>
+        <a:solidFill>
+          <a:schemeClr val="phClr"/>
+        </a:solidFill>
+        <a:gradFill rotWithShape="1">
+          <a:gsLst>
+            <a:gs pos="0">
+              <a:schemeClr val="phClr">
+                <a:lumMod val="110000"/>
+                <a:satMod val="105000"/>
+                <a:tint val="67000"/>
+              </a:schemeClr>
+            </a:gs>
+            <a:gs pos="50000">
+              <a:schemeClr val="phClr">
+                <a:lumMod val="105000"/>
+                <a:satMod val="103000"/>
+                <a:tint val="73000"/>
+              </a:schemeClr>
+            </a:gs>
+            <a:gs pos="100000">
+              <a:schemeClr val="phClr">
+                <a:lumMod val="105000"/>
+                <a:satMod val="109000"/>
+                <a:tint val="81000"/>
+              </a:schemeClr>
+            </a:gs>
+          </a:gsLst>
+          <a:lin ang="5400000" scaled="0"/>
+        </a:gradFill>
+        <a:gradFill rotWithShape="1">
+          <a:gsLst>
+            <a:gs pos="0">
+              <a:schemeClr val="phClr">
+                <a:satMod val="103000"/>
+                <a:lumMod val="102000"/>
+                <a:tint val="94000"/>
+              </a:schemeClr>
+            </a:gs>
+            <a:gs pos="50000">
+              <a:schemeClr val="phClr">
+                <a:satMod val="110000"/>
+                <a:lumMod val="100000"/>
+                <a:shade val="100000"/>
+              </a:schemeClr>
+            </a:gs>
+            <a:gs pos="100000">
+              <a:schemeClr val="phClr">
+                <a:lumMod val="99000"/>
+                <a:satMod val="120000"/>
+                <a:shade val="78000"/>
+              </a:schemeClr>
+            </a:gs>
+          </a:gsLst>
+          <a:lin ang="5400000" scaled="0"/>
+        </a:gradFill>
+      </a:fillStyleLst>
+      <a:lnStyleLst>
+        <a:ln w="6350" cap="flat" cmpd="sng" algn="ctr">
+          <a:solidFill>
+            <a:schemeClr val="phClr"/>
+          </a:solidFill>
+          <a:prstDash val="solid"/>
+          <a:miter lim="800000"/>
+        </a:ln>
+        <a:ln w="12700" cap="flat" cmpd="sng" algn="ctr">
+          <a:solidFill>
+            <a:schemeClr val="phClr"/>
+          </a:solidFill>
+          <a:prstDash val="solid"/>
+          <a:miter lim="800000"/>
+        </a:ln>
+        <a:ln w="19050" cap="flat" cmpd="sng" algn="ctr">
+          <a:solidFill>
+            <a:schemeClr val="phClr"/>
+          </a:solidFill>
+          <a:prstDash val="solid"/>
+          <a:miter lim="800000"/>
+        </a:ln>
+      </a:lnStyleLst>
+      <a:effectStyleLst>
+        <a:effectStyle>
+          <a:effectLst/>
+        </a:effectStyle>
+        <a:effectStyle>
+          <a:effectLst/>
+        </a:effectStyle>
+        <a:effectStyle>
+          <a:effectLst>
+            <a:outerShdw blurRad="57150" dist="19050" dir="5400000" algn="ctr" rotWithShape="0">
+              <a:srgbClr val="000000">
+                <a:alpha val="63000"/>
+              </a:srgbClr>
+            </a:outerShdw>
+          </a:effectLst>
+        </a:effectStyle>
+      </a:effectStyleLst>
+      <a:bgFillStyleLst>
+        <a:solidFill>
+          <a:schemeClr val="phClr"/>
+        </a:solidFill>
+        <a:solidFill>
+          <a:schemeClr val="phClr">
+            <a:tint val="95000"/>
+            <a:satMod val="170000"/>
+          </a:schemeClr>
+        </a:solidFill>
+        <a:gradFill rotWithShape="1">
+          <a:gsLst>
+            <a:gs pos="0">
+              <a:schemeClr val="phClr">
+                <a:tint val="93000"/>
+                <a:satMod val="150000"/>
+                <a:shade val="98000"/>
+                <a:lumMod val="102000"/>
+              </a:schemeClr>
+            </a:gs>
+            <a:gs pos="50000">
+              <a:schemeClr val="phClr">
+                <a:tint val="98000"/>
+                <a:satMod val="130000"/>
+                <a:shade val="90000"/>
+                <a:lumMod val="103000"/>
+              </a:schemeClr>
+            </a:gs>
+            <a:gs pos="100000">
+              <a:schemeClr val="phClr">
+                <a:shade val="63000"/>
+                <a:satMod val="120000"/>
+              </a:schemeClr>
+            </a:gs>
+          </a:gsLst>
+          <a:lin ang="5400000" scaled="0"/>
+        </a:gradFill>
+      </a:bgFillStyleLst>
+    </a:fmtScheme>
+  </a:themeElements>
+  <a:objectDefaults/>
+  <a:extraClrSchemeLst/>
+  <a:extLst>
+    <a:ext uri="{05A4C25C-085E-4340-85A3-A5531E510DB2}">
+      <thm15:themeFamily xmlns:thm15="http://schemas.microsoft.com/office/thememl/2012/main" name="Office Theme" id="{62F939B6-93AF-4DB8-9C6B-D6C7DFDC589F}" vid="{4A3C46E8-61CC-4603-A589-7422A47A8E4A}"/>
+    </a:ext>
+  </a:extLst>
+</a:theme>
 </file>
</xml_diff>